<commit_message>
Update Smart Home TeamNoobcoder.pptx
</commit_message>
<xml_diff>
--- a/Smart Home TeamNoobcoder.pptx
+++ b/Smart Home TeamNoobcoder.pptx
@@ -21,6 +21,7 @@
     <p:sldId id="268" r:id="rId18"/>
     <p:sldId id="267" r:id="rId19"/>
     <p:sldId id="272" r:id="rId20"/>
+    <p:sldId id="273" r:id="rId21"/>
   </p:sldIdLst>
   <p:sldSz cx="12192000" cy="6858000"/>
   <p:notesSz cx="6858000" cy="9144000"/>
@@ -4907,7 +4908,7 @@
           <a:p>
             <a:fld id="{846CE7D5-CF57-46EF-B807-FDD0502418D4}" type="datetimeFigureOut">
               <a:rPr lang="en-US" smtClean="0"/>
-              <a:t>11/15/2020</a:t>
+              <a:t>11/21/2020</a:t>
             </a:fld>
             <a:endParaRPr lang="en-US"/>
           </a:p>
@@ -5075,7 +5076,7 @@
           <a:p>
             <a:fld id="{846CE7D5-CF57-46EF-B807-FDD0502418D4}" type="datetimeFigureOut">
               <a:rPr lang="en-US" smtClean="0"/>
-              <a:t>11/15/2020</a:t>
+              <a:t>11/21/2020</a:t>
             </a:fld>
             <a:endParaRPr lang="en-US"/>
           </a:p>
@@ -5253,7 +5254,7 @@
           <a:p>
             <a:fld id="{846CE7D5-CF57-46EF-B807-FDD0502418D4}" type="datetimeFigureOut">
               <a:rPr lang="en-US" smtClean="0"/>
-              <a:t>11/15/2020</a:t>
+              <a:t>11/21/2020</a:t>
             </a:fld>
             <a:endParaRPr lang="en-US"/>
           </a:p>
@@ -5421,7 +5422,7 @@
           <a:p>
             <a:fld id="{846CE7D5-CF57-46EF-B807-FDD0502418D4}" type="datetimeFigureOut">
               <a:rPr lang="en-US" smtClean="0"/>
-              <a:t>11/15/2020</a:t>
+              <a:t>11/21/2020</a:t>
             </a:fld>
             <a:endParaRPr lang="en-US"/>
           </a:p>
@@ -5666,7 +5667,7 @@
           <a:p>
             <a:fld id="{846CE7D5-CF57-46EF-B807-FDD0502418D4}" type="datetimeFigureOut">
               <a:rPr lang="en-US" smtClean="0"/>
-              <a:t>11/15/2020</a:t>
+              <a:t>11/21/2020</a:t>
             </a:fld>
             <a:endParaRPr lang="en-US"/>
           </a:p>
@@ -5895,7 +5896,7 @@
           <a:p>
             <a:fld id="{846CE7D5-CF57-46EF-B807-FDD0502418D4}" type="datetimeFigureOut">
               <a:rPr lang="en-US" smtClean="0"/>
-              <a:t>11/15/2020</a:t>
+              <a:t>11/21/2020</a:t>
             </a:fld>
             <a:endParaRPr lang="en-US"/>
           </a:p>
@@ -6259,7 +6260,7 @@
           <a:p>
             <a:fld id="{846CE7D5-CF57-46EF-B807-FDD0502418D4}" type="datetimeFigureOut">
               <a:rPr lang="en-US" smtClean="0"/>
-              <a:t>11/15/2020</a:t>
+              <a:t>11/21/2020</a:t>
             </a:fld>
             <a:endParaRPr lang="en-US"/>
           </a:p>
@@ -6376,7 +6377,7 @@
           <a:p>
             <a:fld id="{846CE7D5-CF57-46EF-B807-FDD0502418D4}" type="datetimeFigureOut">
               <a:rPr lang="en-US" smtClean="0"/>
-              <a:t>11/15/2020</a:t>
+              <a:t>11/21/2020</a:t>
             </a:fld>
             <a:endParaRPr lang="en-US"/>
           </a:p>
@@ -6471,7 +6472,7 @@
           <a:p>
             <a:fld id="{846CE7D5-CF57-46EF-B807-FDD0502418D4}" type="datetimeFigureOut">
               <a:rPr lang="en-US" smtClean="0"/>
-              <a:t>11/15/2020</a:t>
+              <a:t>11/21/2020</a:t>
             </a:fld>
             <a:endParaRPr lang="en-US"/>
           </a:p>
@@ -6746,7 +6747,7 @@
           <a:p>
             <a:fld id="{846CE7D5-CF57-46EF-B807-FDD0502418D4}" type="datetimeFigureOut">
               <a:rPr lang="en-US" smtClean="0"/>
-              <a:t>11/15/2020</a:t>
+              <a:t>11/21/2020</a:t>
             </a:fld>
             <a:endParaRPr lang="en-US"/>
           </a:p>
@@ -7001,7 +7002,7 @@
           <a:p>
             <a:fld id="{846CE7D5-CF57-46EF-B807-FDD0502418D4}" type="datetimeFigureOut">
               <a:rPr lang="en-US" smtClean="0"/>
-              <a:t>11/15/2020</a:t>
+              <a:t>11/21/2020</a:t>
             </a:fld>
             <a:endParaRPr lang="en-US"/>
           </a:p>
@@ -7212,7 +7213,7 @@
           <a:p>
             <a:fld id="{846CE7D5-CF57-46EF-B807-FDD0502418D4}" type="datetimeFigureOut">
               <a:rPr lang="en-US" smtClean="0"/>
-              <a:t>11/15/2020</a:t>
+              <a:t>11/21/2020</a:t>
             </a:fld>
             <a:endParaRPr lang="en-US"/>
           </a:p>
@@ -10915,6 +10916,172 @@
 </p:sld>
 </file>
 
+<file path=ppt/slides/slide17.xml><?xml version="1.0" encoding="utf-8"?>
+<p:sld xmlns:a="http://schemas.openxmlformats.org/drawingml/2006/main" xmlns:r="http://schemas.openxmlformats.org/officeDocument/2006/relationships" xmlns:p="http://schemas.openxmlformats.org/presentationml/2006/main">
+  <p:cSld>
+    <p:spTree>
+      <p:nvGrpSpPr>
+        <p:cNvPr id="1" name=""/>
+        <p:cNvGrpSpPr/>
+        <p:nvPr/>
+      </p:nvGrpSpPr>
+      <p:grpSpPr>
+        <a:xfrm>
+          <a:off x="0" y="0"/>
+          <a:ext cx="0" cy="0"/>
+          <a:chOff x="0" y="0"/>
+          <a:chExt cx="0" cy="0"/>
+        </a:xfrm>
+      </p:grpSpPr>
+      <p:sp>
+        <p:nvSpPr>
+          <p:cNvPr id="2" name="Title 1">
+            <a:extLst>
+              <a:ext uri="{FF2B5EF4-FFF2-40B4-BE49-F238E27FC236}">
+                <a16:creationId xmlns:a16="http://schemas.microsoft.com/office/drawing/2014/main" id="{56FB6D8D-09E2-440C-9691-C70E943CBDA9}"/>
+              </a:ext>
+            </a:extLst>
+          </p:cNvPr>
+          <p:cNvSpPr>
+            <a:spLocks noGrp="1"/>
+          </p:cNvSpPr>
+          <p:nvPr>
+            <p:ph type="title"/>
+          </p:nvPr>
+        </p:nvSpPr>
+        <p:spPr/>
+        <p:txBody>
+          <a:bodyPr/>
+          <a:lstStyle/>
+          <a:p>
+            <a:r>
+              <a:rPr lang="en-US" dirty="0"/>
+              <a:t>Advantages</a:t>
+            </a:r>
+            <a:endParaRPr lang="en-DE" dirty="0"/>
+          </a:p>
+        </p:txBody>
+      </p:sp>
+      <p:sp>
+        <p:nvSpPr>
+          <p:cNvPr id="3" name="Content Placeholder 2">
+            <a:extLst>
+              <a:ext uri="{FF2B5EF4-FFF2-40B4-BE49-F238E27FC236}">
+                <a16:creationId xmlns:a16="http://schemas.microsoft.com/office/drawing/2014/main" id="{9E8B7EA0-E4EB-4016-A4E7-5946766610DB}"/>
+              </a:ext>
+            </a:extLst>
+          </p:cNvPr>
+          <p:cNvSpPr>
+            <a:spLocks noGrp="1"/>
+          </p:cNvSpPr>
+          <p:nvPr>
+            <p:ph idx="1"/>
+          </p:nvPr>
+        </p:nvSpPr>
+        <p:spPr/>
+        <p:txBody>
+          <a:bodyPr>
+            <a:normAutofit fontScale="62500" lnSpcReduction="20000"/>
+          </a:bodyPr>
+          <a:lstStyle/>
+          <a:p>
+            <a:r>
+              <a:rPr lang="en-US" dirty="0"/>
+              <a:t>Saving</a:t>
+            </a:r>
+          </a:p>
+          <a:p>
+            <a:pPr marL="0" indent="0">
+              <a:buNone/>
+            </a:pPr>
+            <a:r>
+              <a:rPr lang="en-US" dirty="0"/>
+              <a:t>- The financial saving will get your attention, where the smart home technology can alone save anywhere from 10%-30% money on your energy bills.</a:t>
+            </a:r>
+          </a:p>
+          <a:p>
+            <a:r>
+              <a:rPr lang="en-US" dirty="0"/>
+              <a:t>Safety</a:t>
+            </a:r>
+          </a:p>
+          <a:p>
+            <a:pPr marL="0" indent="0">
+              <a:buNone/>
+            </a:pPr>
+            <a:r>
+              <a:rPr lang="en-US" dirty="0"/>
+              <a:t>- User can install a security system that allows them to monitor any suspicious activities that occur in and around your home.</a:t>
+            </a:r>
+          </a:p>
+          <a:p>
+            <a:r>
+              <a:rPr lang="en-US" dirty="0"/>
+              <a:t>Control</a:t>
+            </a:r>
+          </a:p>
+          <a:p>
+            <a:pPr marL="0" indent="0">
+              <a:buNone/>
+            </a:pPr>
+            <a:r>
+              <a:rPr lang="en-US" dirty="0"/>
+              <a:t>- The control at your fingertips is provided by smart home technology. You can use your mobile apps to control the functionality of your home from anywhere in the world now. </a:t>
+            </a:r>
+          </a:p>
+          <a:p>
+            <a:r>
+              <a:rPr lang="en-US" dirty="0"/>
+              <a:t>Convenience</a:t>
+            </a:r>
+          </a:p>
+          <a:p>
+            <a:pPr marL="0" indent="0">
+              <a:buNone/>
+            </a:pPr>
+            <a:r>
+              <a:rPr lang="en-US" dirty="0"/>
+              <a:t>- It </a:t>
+            </a:r>
+            <a:r>
+              <a:rPr lang="en-US"/>
+              <a:t>allows user </a:t>
+            </a:r>
+            <a:r>
+              <a:rPr lang="en-US" dirty="0"/>
+              <a:t>to use the mobile and tables and you’ll be able to tap into enormous functions and appliances throughout the home.</a:t>
+            </a:r>
+          </a:p>
+          <a:p>
+            <a:r>
+              <a:rPr lang="en-US" dirty="0"/>
+              <a:t>Comfort</a:t>
+            </a:r>
+          </a:p>
+          <a:p>
+            <a:pPr marL="0" indent="0">
+              <a:buNone/>
+            </a:pPr>
+            <a:r>
+              <a:rPr lang="en-US" dirty="0"/>
+              <a:t>- Having smart home technology can just make our lives easy, as it improves the functionality of appliances, thus helping them run better</a:t>
+            </a:r>
+          </a:p>
+        </p:txBody>
+      </p:sp>
+    </p:spTree>
+    <p:extLst>
+      <p:ext uri="{BB962C8B-B14F-4D97-AF65-F5344CB8AC3E}">
+        <p14:creationId xmlns:p14="http://schemas.microsoft.com/office/powerpoint/2010/main" val="3157970513"/>
+      </p:ext>
+    </p:extLst>
+  </p:cSld>
+  <p:clrMapOvr>
+    <a:masterClrMapping/>
+  </p:clrMapOvr>
+</p:sld>
+</file>
+
 <file path=ppt/slides/slide2.xml><?xml version="1.0" encoding="utf-8"?>
 <p:sld xmlns:a="http://schemas.openxmlformats.org/drawingml/2006/main" xmlns:r="http://schemas.openxmlformats.org/officeDocument/2006/relationships" xmlns:p="http://schemas.openxmlformats.org/presentationml/2006/main">
   <p:cSld>
@@ -13317,15 +13484,6 @@
 </file>
 
 <file path=customXml/item1.xml><?xml version="1.0" encoding="utf-8"?>
-<?mso-contentType ?>
-<FormTemplates xmlns="http://schemas.microsoft.com/sharepoint/v3/contenttype/forms">
-  <Display>DocumentLibraryForm</Display>
-  <Edit>DocumentLibraryForm</Edit>
-  <New>DocumentLibraryForm</New>
-</FormTemplates>
-</file>
-
-<file path=customXml/item2.xml><?xml version="1.0" encoding="utf-8"?>
 <ct:contentTypeSchema xmlns:ct="http://schemas.microsoft.com/office/2006/metadata/contentType" xmlns:ma="http://schemas.microsoft.com/office/2006/metadata/properties/metaAttributes" ct:_="" ma:_="" ma:contentTypeName="Document" ma:contentTypeID="0x010100D973745A54E1F940816A7DA2A8D1DDBD" ma:contentTypeVersion="2" ma:contentTypeDescription="Create a new document." ma:contentTypeScope="" ma:versionID="84b7a6704b22df89a7c9e55e2653863b">
   <xsd:schema xmlns:xsd="http://www.w3.org/2001/XMLSchema" xmlns:xs="http://www.w3.org/2001/XMLSchema" xmlns:p="http://schemas.microsoft.com/office/2006/metadata/properties" xmlns:ns2="e0689a4a-487c-484b-bb27-80183cfbfa40" targetNamespace="http://schemas.microsoft.com/office/2006/metadata/properties" ma:root="true" ma:fieldsID="31532077622de2acde8666fafb6fa5ef" ns2:_="">
     <xsd:import namespace="e0689a4a-487c-484b-bb27-80183cfbfa40"/>
@@ -13457,6 +13615,15 @@
 </ct:contentTypeSchema>
 </file>
 
+<file path=customXml/item2.xml><?xml version="1.0" encoding="utf-8"?>
+<?mso-contentType ?>
+<FormTemplates xmlns="http://schemas.microsoft.com/sharepoint/v3/contenttype/forms">
+  <Display>DocumentLibraryForm</Display>
+  <Edit>DocumentLibraryForm</Edit>
+  <New>DocumentLibraryForm</New>
+</FormTemplates>
+</file>
+
 <file path=customXml/item3.xml><?xml version="1.0" encoding="utf-8"?>
 <p:properties xmlns:p="http://schemas.microsoft.com/office/2006/metadata/properties" xmlns:xsi="http://www.w3.org/2001/XMLSchema-instance" xmlns:pc="http://schemas.microsoft.com/office/infopath/2007/PartnerControls">
   <documentManagement/>
@@ -13464,14 +13631,6 @@
 </file>
 
 <file path=customXml/itemProps1.xml><?xml version="1.0" encoding="utf-8"?>
-<ds:datastoreItem xmlns:ds="http://schemas.openxmlformats.org/officeDocument/2006/customXml" ds:itemID="{2EDD09B3-23C0-4941-9430-47739D6329F7}">
-  <ds:schemaRefs>
-    <ds:schemaRef ds:uri="http://schemas.microsoft.com/sharepoint/v3/contenttype/forms"/>
-  </ds:schemaRefs>
-</ds:datastoreItem>
-</file>
-
-<file path=customXml/itemProps2.xml><?xml version="1.0" encoding="utf-8"?>
 <ds:datastoreItem xmlns:ds="http://schemas.openxmlformats.org/officeDocument/2006/customXml" ds:itemID="{85E8A985-78FD-4040-8584-DCD1A78232D6}">
   <ds:schemaRefs>
     <ds:schemaRef ds:uri="e0689a4a-487c-484b-bb27-80183cfbfa40"/>
@@ -13489,6 +13648,14 @@
 </ds:datastoreItem>
 </file>
 
+<file path=customXml/itemProps2.xml><?xml version="1.0" encoding="utf-8"?>
+<ds:datastoreItem xmlns:ds="http://schemas.openxmlformats.org/officeDocument/2006/customXml" ds:itemID="{2EDD09B3-23C0-4941-9430-47739D6329F7}">
+  <ds:schemaRefs>
+    <ds:schemaRef ds:uri="http://schemas.microsoft.com/sharepoint/v3/contenttype/forms"/>
+  </ds:schemaRefs>
+</ds:datastoreItem>
+</file>
+
 <file path=customXml/itemProps3.xml><?xml version="1.0" encoding="utf-8"?>
 <ds:datastoreItem xmlns:ds="http://schemas.openxmlformats.org/officeDocument/2006/customXml" ds:itemID="{13726219-3614-45BE-8F92-AD9277358475}">
   <ds:schemaRefs>

</xml_diff>